<commit_message>
added some points in model training section
</commit_message>
<xml_diff>
--- a/Leaf Classification & Optimizations using SGD Classifier.pptx
+++ b/Leaf Classification & Optimizations using SGD Classifier.pptx
@@ -113,6 +113,11 @@
       </a:defRPr>
     </a:lvl9pPr>
   </p:defaultTextStyle>
+  <p:extLst>
+    <p:ext uri="{EFAFB233-063F-42B5-8137-9DF3F51BA10A}">
+      <p15:sldGuideLst xmlns:p15="http://schemas.microsoft.com/office/powerpoint/2012/main"/>
+    </p:ext>
+  </p:extLst>
 </p:presentation>
 </file>
 
@@ -3621,7 +3626,7 @@
           <a:p>
             <a:fld id="{D1D1EADE-8E88-4C7C-8AC5-FB148DE4940E}" type="datetime1">
               <a:rPr lang="en-US" smtClean="0"/>
-              <a:t>4/11/2025</a:t>
+              <a:t>4/16/2025</a:t>
             </a:fld>
             <a:endParaRPr lang="en-US"/>
           </a:p>
@@ -3821,7 +3826,7 @@
           <a:p>
             <a:fld id="{EC3C8B9C-477D-492A-96AD-1FC2CC997A73}" type="datetime1">
               <a:rPr lang="en-US" smtClean="0"/>
-              <a:t>4/11/2025</a:t>
+              <a:t>4/16/2025</a:t>
             </a:fld>
             <a:endParaRPr lang="en-US"/>
           </a:p>
@@ -4031,7 +4036,7 @@
           <a:p>
             <a:fld id="{42D3AED5-E26D-4E29-B1B3-7847B6779594}" type="datetime1">
               <a:rPr lang="en-US" smtClean="0"/>
-              <a:t>4/11/2025</a:t>
+              <a:t>4/16/2025</a:t>
             </a:fld>
             <a:endParaRPr lang="en-US"/>
           </a:p>
@@ -4231,7 +4236,7 @@
           <a:p>
             <a:fld id="{157B6794-849E-4626-908B-D15793550EFB}" type="datetime1">
               <a:rPr lang="en-US" smtClean="0"/>
-              <a:t>4/11/2025</a:t>
+              <a:t>4/16/2025</a:t>
             </a:fld>
             <a:endParaRPr lang="en-US"/>
           </a:p>
@@ -4507,7 +4512,7 @@
           <a:p>
             <a:fld id="{63DB64E7-5594-42A3-ADBF-E95A7ACEAD64}" type="datetime1">
               <a:rPr lang="en-US" smtClean="0"/>
-              <a:t>4/11/2025</a:t>
+              <a:t>4/16/2025</a:t>
             </a:fld>
             <a:endParaRPr lang="en-US"/>
           </a:p>
@@ -4780,7 +4785,7 @@
           <a:p>
             <a:fld id="{18462B0B-D248-4FFB-8695-AD7FA4B1284A}" type="datetime1">
               <a:rPr lang="en-US" smtClean="0"/>
-              <a:t>4/11/2025</a:t>
+              <a:t>4/16/2025</a:t>
             </a:fld>
             <a:endParaRPr lang="en-US"/>
           </a:p>
@@ -5203,7 +5208,7 @@
           <a:p>
             <a:fld id="{D0378EFB-9159-4510-B73F-4F0409ADE937}" type="datetime1">
               <a:rPr lang="en-US" smtClean="0"/>
-              <a:t>4/11/2025</a:t>
+              <a:t>4/16/2025</a:t>
             </a:fld>
             <a:endParaRPr lang="en-US"/>
           </a:p>
@@ -5345,7 +5350,7 @@
           <a:p>
             <a:fld id="{89BC9412-2452-4BED-A324-9D8C115361AD}" type="datetime1">
               <a:rPr lang="en-US" smtClean="0"/>
-              <a:t>4/11/2025</a:t>
+              <a:t>4/16/2025</a:t>
             </a:fld>
             <a:endParaRPr lang="en-US"/>
           </a:p>
@@ -5458,7 +5463,7 @@
           <a:p>
             <a:fld id="{F5318F62-D251-40E8-A23C-F4CFE9FEAB41}" type="datetime1">
               <a:rPr lang="en-US" smtClean="0"/>
-              <a:t>4/11/2025</a:t>
+              <a:t>4/16/2025</a:t>
             </a:fld>
             <a:endParaRPr lang="en-US"/>
           </a:p>
@@ -5771,7 +5776,7 @@
           <a:p>
             <a:fld id="{44F76144-149E-4874-93A5-554A0357CF82}" type="datetime1">
               <a:rPr lang="en-US" smtClean="0"/>
-              <a:t>4/11/2025</a:t>
+              <a:t>4/16/2025</a:t>
             </a:fld>
             <a:endParaRPr lang="en-US"/>
           </a:p>
@@ -6064,7 +6069,7 @@
           <a:p>
             <a:fld id="{50BA65D8-0540-4835-AE5C-25D29DBA01BE}" type="datetime1">
               <a:rPr lang="en-US" smtClean="0"/>
-              <a:t>4/11/2025</a:t>
+              <a:t>4/16/2025</a:t>
             </a:fld>
             <a:endParaRPr lang="en-US"/>
           </a:p>
@@ -6306,7 +6311,7 @@
           <a:p>
             <a:fld id="{E31BA835-12AC-4E8F-955A-EA3F4DE2791F}" type="datetime1">
               <a:rPr lang="en-US" smtClean="0"/>
-              <a:t>4/11/2025</a:t>
+              <a:t>4/16/2025</a:t>
             </a:fld>
             <a:endParaRPr lang="en-US"/>
           </a:p>
@@ -9407,7 +9412,7 @@
         <p:spPr>
           <a:xfrm>
             <a:off x="700635" y="1991426"/>
-            <a:ext cx="4246269" cy="2121030"/>
+            <a:ext cx="4246269" cy="2952027"/>
           </a:xfrm>
           <a:prstGeom prst="rect">
             <a:avLst/>
@@ -9450,7 +9455,20 @@
             </a:pPr>
             <a:r>
               <a:rPr lang="en-US" dirty="0"/>
-              <a:t>Overall, a good performance as we have used small dataset as well as before optimization</a:t>
+              <a:t>Overall, a good performance as we have used small dataset as well as before optimization.</a:t>
+            </a:r>
+          </a:p>
+          <a:p>
+            <a:pPr marL="285750" indent="-285750">
+              <a:lnSpc>
+                <a:spcPct val="150000"/>
+              </a:lnSpc>
+              <a:buFont typeface="Wingdings" panose="05000000000000000000" pitchFamily="2" charset="2"/>
+              <a:buChar char="ü"/>
+            </a:pPr>
+            <a:r>
+              <a:rPr lang="en-US" dirty="0"/>
+              <a:t>This classification report is generated using 20% remaining test set. </a:t>
             </a:r>
           </a:p>
         </p:txBody>

</xml_diff>